<commit_message>
Add more details about the Shared Interface Proxy and Kernel Converters
Fix SI_4.png
</commit_message>
<xml_diff>
--- a/ApplicationDeveloperGuide/images/SI_4.pptx
+++ b/ApplicationDeveloperGuide/images/SI_4.pptx
@@ -261,7 +261,7 @@
           <a:p>
             <a:fld id="{3F4756A7-5FC8-44ED-AD4F-03C094E3404D}" type="datetimeFigureOut">
               <a:rPr lang="en-GB" smtClean="0"/>
-              <a:t>27/02/2020</a:t>
+              <a:t>04/12/2025</a:t>
             </a:fld>
             <a:endParaRPr lang="en-GB"/>
           </a:p>
@@ -461,7 +461,7 @@
           <a:p>
             <a:fld id="{3F4756A7-5FC8-44ED-AD4F-03C094E3404D}" type="datetimeFigureOut">
               <a:rPr lang="en-GB" smtClean="0"/>
-              <a:t>27/02/2020</a:t>
+              <a:t>04/12/2025</a:t>
             </a:fld>
             <a:endParaRPr lang="en-GB"/>
           </a:p>
@@ -671,7 +671,7 @@
           <a:p>
             <a:fld id="{3F4756A7-5FC8-44ED-AD4F-03C094E3404D}" type="datetimeFigureOut">
               <a:rPr lang="en-GB" smtClean="0"/>
-              <a:t>27/02/2020</a:t>
+              <a:t>04/12/2025</a:t>
             </a:fld>
             <a:endParaRPr lang="en-GB"/>
           </a:p>
@@ -871,7 +871,7 @@
           <a:p>
             <a:fld id="{3F4756A7-5FC8-44ED-AD4F-03C094E3404D}" type="datetimeFigureOut">
               <a:rPr lang="en-GB" smtClean="0"/>
-              <a:t>27/02/2020</a:t>
+              <a:t>04/12/2025</a:t>
             </a:fld>
             <a:endParaRPr lang="en-GB"/>
           </a:p>
@@ -1147,7 +1147,7 @@
           <a:p>
             <a:fld id="{3F4756A7-5FC8-44ED-AD4F-03C094E3404D}" type="datetimeFigureOut">
               <a:rPr lang="en-GB" smtClean="0"/>
-              <a:t>27/02/2020</a:t>
+              <a:t>04/12/2025</a:t>
             </a:fld>
             <a:endParaRPr lang="en-GB"/>
           </a:p>
@@ -1415,7 +1415,7 @@
           <a:p>
             <a:fld id="{3F4756A7-5FC8-44ED-AD4F-03C094E3404D}" type="datetimeFigureOut">
               <a:rPr lang="en-GB" smtClean="0"/>
-              <a:t>27/02/2020</a:t>
+              <a:t>04/12/2025</a:t>
             </a:fld>
             <a:endParaRPr lang="en-GB"/>
           </a:p>
@@ -1830,7 +1830,7 @@
           <a:p>
             <a:fld id="{3F4756A7-5FC8-44ED-AD4F-03C094E3404D}" type="datetimeFigureOut">
               <a:rPr lang="en-GB" smtClean="0"/>
-              <a:t>27/02/2020</a:t>
+              <a:t>04/12/2025</a:t>
             </a:fld>
             <a:endParaRPr lang="en-GB"/>
           </a:p>
@@ -1972,7 +1972,7 @@
           <a:p>
             <a:fld id="{3F4756A7-5FC8-44ED-AD4F-03C094E3404D}" type="datetimeFigureOut">
               <a:rPr lang="en-GB" smtClean="0"/>
-              <a:t>27/02/2020</a:t>
+              <a:t>04/12/2025</a:t>
             </a:fld>
             <a:endParaRPr lang="en-GB"/>
           </a:p>
@@ -2085,7 +2085,7 @@
           <a:p>
             <a:fld id="{3F4756A7-5FC8-44ED-AD4F-03C094E3404D}" type="datetimeFigureOut">
               <a:rPr lang="en-GB" smtClean="0"/>
-              <a:t>27/02/2020</a:t>
+              <a:t>04/12/2025</a:t>
             </a:fld>
             <a:endParaRPr lang="en-GB"/>
           </a:p>
@@ -2398,7 +2398,7 @@
           <a:p>
             <a:fld id="{3F4756A7-5FC8-44ED-AD4F-03C094E3404D}" type="datetimeFigureOut">
               <a:rPr lang="en-GB" smtClean="0"/>
-              <a:t>27/02/2020</a:t>
+              <a:t>04/12/2025</a:t>
             </a:fld>
             <a:endParaRPr lang="en-GB"/>
           </a:p>
@@ -2687,7 +2687,7 @@
           <a:p>
             <a:fld id="{3F4756A7-5FC8-44ED-AD4F-03C094E3404D}" type="datetimeFigureOut">
               <a:rPr lang="en-GB" smtClean="0"/>
-              <a:t>27/02/2020</a:t>
+              <a:t>04/12/2025</a:t>
             </a:fld>
             <a:endParaRPr lang="en-GB"/>
           </a:p>
@@ -2930,7 +2930,7 @@
           <a:p>
             <a:fld id="{3F4756A7-5FC8-44ED-AD4F-03C094E3404D}" type="datetimeFigureOut">
               <a:rPr lang="en-GB" smtClean="0"/>
-              <a:t>27/02/2020</a:t>
+              <a:t>04/12/2025</a:t>
             </a:fld>
             <a:endParaRPr lang="en-GB"/>
           </a:p>
@@ -3851,29 +3851,7 @@
                   <a:ea typeface="Source Sans Pro Light" charset="0"/>
                   <a:cs typeface="Source Sans Pro Light" charset="0"/>
                 </a:rPr>
-                <a:t>R = </a:t>
-              </a:r>
-              <a:r>
-                <a:rPr lang="en-US" sz="1400" kern="0" dirty="0" err="1">
-                  <a:solidFill>
-                    <a:srgbClr val="FFFFFF"/>
-                  </a:solidFill>
-                  <a:latin typeface="Consolas" panose="020B0609020204030204" pitchFamily="49" charset="0"/>
-                  <a:ea typeface="Source Sans Pro Light" charset="0"/>
-                  <a:cs typeface="Source Sans Pro Light" charset="0"/>
-                </a:rPr>
-                <a:t>AA.mm</a:t>
-              </a:r>
-              <a:r>
-                <a:rPr lang="en-US" sz="1400" kern="0" dirty="0">
-                  <a:solidFill>
-                    <a:srgbClr val="FFFFFF"/>
-                  </a:solidFill>
-                  <a:latin typeface="Consolas" panose="020B0609020204030204" pitchFamily="49" charset="0"/>
-                  <a:ea typeface="Source Sans Pro Light" charset="0"/>
-                  <a:cs typeface="Source Sans Pro Light" charset="0"/>
-                </a:rPr>
-                <a:t>(P1, P2</a:t>
+                <a:t>R = AA.mm(P1, P2)</a:t>
               </a:r>
             </a:p>
             <a:p>

</xml_diff>